<commit_message>
Rename the ISAD file to what Aj. Manop wants
</commit_message>
<xml_diff>
--- a/ISAD/ISAD Presentation.pptx
+++ b/ISAD/ISAD Presentation.pptx
@@ -5,7 +5,7 @@
     <p:sldMasterId id="2147483648" r:id="rId4"/>
   </p:sldMasterIdLst>
   <p:notesMasterIdLst>
-    <p:notesMasterId r:id="rId14"/>
+    <p:notesMasterId r:id="rId15"/>
   </p:notesMasterIdLst>
   <p:sldIdLst>
     <p:sldId id="256" r:id="rId5"/>
@@ -13,10 +13,11 @@
     <p:sldId id="262" r:id="rId7"/>
     <p:sldId id="257" r:id="rId8"/>
     <p:sldId id="263" r:id="rId9"/>
-    <p:sldId id="264" r:id="rId10"/>
-    <p:sldId id="258" r:id="rId11"/>
-    <p:sldId id="260" r:id="rId12"/>
-    <p:sldId id="259" r:id="rId13"/>
+    <p:sldId id="265" r:id="rId10"/>
+    <p:sldId id="264" r:id="rId11"/>
+    <p:sldId id="258" r:id="rId12"/>
+    <p:sldId id="260" r:id="rId13"/>
+    <p:sldId id="259" r:id="rId14"/>
   </p:sldIdLst>
   <p:sldSz cx="12192000" cy="6858000"/>
   <p:notesSz cx="6858000" cy="9144000"/>
@@ -126,7 +127,7 @@
 <file path=ppt/revisionInfo.xml><?xml version="1.0" encoding="utf-8"?>
 <p1510:revInfo xmlns:a="http://schemas.openxmlformats.org/drawingml/2006/main" xmlns:r="http://schemas.openxmlformats.org/officeDocument/2006/relationships" xmlns:p1510="http://schemas.microsoft.com/office/powerpoint/2015/10/main">
   <p1510:revLst>
-    <p1510:client id="{D762F1D6-3E1F-4814-B575-061CD0F7EAC8}" v="453" dt="2018-04-29T04:02:34.109"/>
+    <p1510:client id="{D762F1D6-3E1F-4814-B575-061CD0F7EAC8}" v="561" dt="2018-04-29T04:55:37.799"/>
   </p1510:revLst>
 </p1510:revInfo>
 </file>
@@ -136,7 +137,7 @@
   <pc:docChgLst>
     <pc:chgData name="nathan yiangsuppanontr" userId="2c8140d7-f762-4df7-a8bf-7f7de49f995c" providerId="ADAL" clId="{D762F1D6-3E1F-4814-B575-061CD0F7EAC8}"/>
     <pc:docChg chg="undo custSel addSld modSld">
-      <pc:chgData name="nathan yiangsuppanontr" userId="2c8140d7-f762-4df7-a8bf-7f7de49f995c" providerId="ADAL" clId="{D762F1D6-3E1F-4814-B575-061CD0F7EAC8}" dt="2018-04-29T04:02:34.109" v="452" actId="20577"/>
+      <pc:chgData name="nathan yiangsuppanontr" userId="2c8140d7-f762-4df7-a8bf-7f7de49f995c" providerId="ADAL" clId="{D762F1D6-3E1F-4814-B575-061CD0F7EAC8}" dt="2018-04-29T04:55:37.799" v="560" actId="1076"/>
       <pc:docMkLst>
         <pc:docMk/>
       </pc:docMkLst>
@@ -335,7 +336,7 @@
         </pc:spChg>
       </pc:sldChg>
       <pc:sldChg chg="addSp delSp modSp add">
-        <pc:chgData name="nathan yiangsuppanontr" userId="2c8140d7-f762-4df7-a8bf-7f7de49f995c" providerId="ADAL" clId="{D762F1D6-3E1F-4814-B575-061CD0F7EAC8}" dt="2018-04-29T04:02:34.109" v="452" actId="20577"/>
+        <pc:chgData name="nathan yiangsuppanontr" userId="2c8140d7-f762-4df7-a8bf-7f7de49f995c" providerId="ADAL" clId="{D762F1D6-3E1F-4814-B575-061CD0F7EAC8}" dt="2018-04-29T04:55:37.799" v="560" actId="1076"/>
         <pc:sldMkLst>
           <pc:docMk/>
           <pc:sldMk cId="1112383724" sldId="264"/>
@@ -357,7 +358,7 @@
           </ac:spMkLst>
         </pc:spChg>
         <pc:spChg chg="add mod">
-          <ac:chgData name="nathan yiangsuppanontr" userId="2c8140d7-f762-4df7-a8bf-7f7de49f995c" providerId="ADAL" clId="{D762F1D6-3E1F-4814-B575-061CD0F7EAC8}" dt="2018-04-29T04:02:34.109" v="452" actId="20577"/>
+          <ac:chgData name="nathan yiangsuppanontr" userId="2c8140d7-f762-4df7-a8bf-7f7de49f995c" providerId="ADAL" clId="{D762F1D6-3E1F-4814-B575-061CD0F7EAC8}" dt="2018-04-29T04:06:16.667" v="496" actId="1035"/>
           <ac:spMkLst>
             <pc:docMk/>
             <pc:sldMk cId="1112383724" sldId="264"/>
@@ -365,7 +366,7 @@
           </ac:spMkLst>
         </pc:spChg>
         <pc:spChg chg="add mod">
-          <ac:chgData name="nathan yiangsuppanontr" userId="2c8140d7-f762-4df7-a8bf-7f7de49f995c" providerId="ADAL" clId="{D762F1D6-3E1F-4814-B575-061CD0F7EAC8}" dt="2018-04-29T04:02:28.654" v="445" actId="20577"/>
+          <ac:chgData name="nathan yiangsuppanontr" userId="2c8140d7-f762-4df7-a8bf-7f7de49f995c" providerId="ADAL" clId="{D762F1D6-3E1F-4814-B575-061CD0F7EAC8}" dt="2018-04-29T04:06:16.667" v="496" actId="1035"/>
           <ac:spMkLst>
             <pc:docMk/>
             <pc:sldMk cId="1112383724" sldId="264"/>
@@ -380,8 +381,8 @@
             <ac:spMk id="10" creationId="{F6E325AC-AC5C-4F3B-A5C5-FF64EAD6C812}"/>
           </ac:spMkLst>
         </pc:spChg>
-        <pc:picChg chg="add mod">
-          <ac:chgData name="nathan yiangsuppanontr" userId="2c8140d7-f762-4df7-a8bf-7f7de49f995c" providerId="ADAL" clId="{D762F1D6-3E1F-4814-B575-061CD0F7EAC8}" dt="2018-04-29T04:01:36.176" v="417" actId="408"/>
+        <pc:picChg chg="add del mod">
+          <ac:chgData name="nathan yiangsuppanontr" userId="2c8140d7-f762-4df7-a8bf-7f7de49f995c" providerId="ADAL" clId="{D762F1D6-3E1F-4814-B575-061CD0F7EAC8}" dt="2018-04-29T04:55:31.831" v="559" actId="478"/>
           <ac:picMkLst>
             <pc:docMk/>
             <pc:sldMk cId="1112383724" sldId="264"/>
@@ -389,7 +390,7 @@
           </ac:picMkLst>
         </pc:picChg>
         <pc:picChg chg="add mod">
-          <ac:chgData name="nathan yiangsuppanontr" userId="2c8140d7-f762-4df7-a8bf-7f7de49f995c" providerId="ADAL" clId="{D762F1D6-3E1F-4814-B575-061CD0F7EAC8}" dt="2018-04-29T04:01:36.176" v="417" actId="408"/>
+          <ac:chgData name="nathan yiangsuppanontr" userId="2c8140d7-f762-4df7-a8bf-7f7de49f995c" providerId="ADAL" clId="{D762F1D6-3E1F-4814-B575-061CD0F7EAC8}" dt="2018-04-29T04:55:37.799" v="560" actId="1076"/>
           <ac:picMkLst>
             <pc:docMk/>
             <pc:sldMk cId="1112383724" sldId="264"/>
@@ -397,7 +398,7 @@
           </ac:picMkLst>
         </pc:picChg>
         <pc:picChg chg="add mod">
-          <ac:chgData name="nathan yiangsuppanontr" userId="2c8140d7-f762-4df7-a8bf-7f7de49f995c" providerId="ADAL" clId="{D762F1D6-3E1F-4814-B575-061CD0F7EAC8}" dt="2018-04-29T04:01:24.283" v="416" actId="1036"/>
+          <ac:chgData name="nathan yiangsuppanontr" userId="2c8140d7-f762-4df7-a8bf-7f7de49f995c" providerId="ADAL" clId="{D762F1D6-3E1F-4814-B575-061CD0F7EAC8}" dt="2018-04-29T04:06:16.667" v="496" actId="1035"/>
           <ac:picMkLst>
             <pc:docMk/>
             <pc:sldMk cId="1112383724" sldId="264"/>
@@ -405,13 +406,52 @@
           </ac:picMkLst>
         </pc:picChg>
         <pc:picChg chg="add mod">
-          <ac:chgData name="nathan yiangsuppanontr" userId="2c8140d7-f762-4df7-a8bf-7f7de49f995c" providerId="ADAL" clId="{D762F1D6-3E1F-4814-B575-061CD0F7EAC8}" dt="2018-04-29T04:01:36.176" v="417" actId="408"/>
+          <ac:chgData name="nathan yiangsuppanontr" userId="2c8140d7-f762-4df7-a8bf-7f7de49f995c" providerId="ADAL" clId="{D762F1D6-3E1F-4814-B575-061CD0F7EAC8}" dt="2018-04-29T04:55:37.799" v="560" actId="1076"/>
           <ac:picMkLst>
             <pc:docMk/>
             <pc:sldMk cId="1112383724" sldId="264"/>
             <ac:picMk id="9" creationId="{CCB96856-A25E-4274-A0FC-FF98FF432CFD}"/>
           </ac:picMkLst>
         </pc:picChg>
+        <pc:cxnChg chg="add mod">
+          <ac:chgData name="nathan yiangsuppanontr" userId="2c8140d7-f762-4df7-a8bf-7f7de49f995c" providerId="ADAL" clId="{D762F1D6-3E1F-4814-B575-061CD0F7EAC8}" dt="2018-04-29T04:06:43.771" v="498" actId="1582"/>
+          <ac:cxnSpMkLst>
+            <pc:docMk/>
+            <pc:sldMk cId="1112383724" sldId="264"/>
+            <ac:cxnSpMk id="10" creationId="{5D821B20-B961-4FCA-8F59-5C1A034B03A0}"/>
+          </ac:cxnSpMkLst>
+        </pc:cxnChg>
+        <pc:cxnChg chg="add mod">
+          <ac:chgData name="nathan yiangsuppanontr" userId="2c8140d7-f762-4df7-a8bf-7f7de49f995c" providerId="ADAL" clId="{D762F1D6-3E1F-4814-B575-061CD0F7EAC8}" dt="2018-04-29T04:06:40.314" v="497" actId="1582"/>
+          <ac:cxnSpMkLst>
+            <pc:docMk/>
+            <pc:sldMk cId="1112383724" sldId="264"/>
+            <ac:cxnSpMk id="13" creationId="{74B27D97-A0FA-48F8-92C6-8F5F317888D4}"/>
+          </ac:cxnSpMkLst>
+        </pc:cxnChg>
+      </pc:sldChg>
+      <pc:sldChg chg="addSp modSp add">
+        <pc:chgData name="nathan yiangsuppanontr" userId="2c8140d7-f762-4df7-a8bf-7f7de49f995c" providerId="ADAL" clId="{D762F1D6-3E1F-4814-B575-061CD0F7EAC8}" dt="2018-04-29T04:09:18.507" v="558" actId="255"/>
+        <pc:sldMkLst>
+          <pc:docMk/>
+          <pc:sldMk cId="3868707770" sldId="265"/>
+        </pc:sldMkLst>
+        <pc:spChg chg="add mod">
+          <ac:chgData name="nathan yiangsuppanontr" userId="2c8140d7-f762-4df7-a8bf-7f7de49f995c" providerId="ADAL" clId="{D762F1D6-3E1F-4814-B575-061CD0F7EAC8}" dt="2018-04-29T04:08:53.128" v="555" actId="1076"/>
+          <ac:spMkLst>
+            <pc:docMk/>
+            <pc:sldMk cId="3868707770" sldId="265"/>
+            <ac:spMk id="2" creationId="{53E08343-2CA5-44CE-9F35-3E70CC1E0052}"/>
+          </ac:spMkLst>
+        </pc:spChg>
+        <pc:spChg chg="add mod">
+          <ac:chgData name="nathan yiangsuppanontr" userId="2c8140d7-f762-4df7-a8bf-7f7de49f995c" providerId="ADAL" clId="{D762F1D6-3E1F-4814-B575-061CD0F7EAC8}" dt="2018-04-29T04:09:18.507" v="558" actId="255"/>
+          <ac:spMkLst>
+            <pc:docMk/>
+            <pc:sldMk cId="3868707770" sldId="265"/>
+            <ac:spMk id="3" creationId="{BE9820D2-FF3D-4859-9F1B-6B82E875F40E}"/>
+          </ac:spMkLst>
+        </pc:spChg>
       </pc:sldChg>
     </pc:docChg>
   </pc:docChgLst>
@@ -4109,6 +4149,116 @@
 </p:sld>
 </file>
 
+<file path=ppt/slides/slide10.xml><?xml version="1.0" encoding="utf-8"?>
+<p:sld xmlns:a="http://schemas.openxmlformats.org/drawingml/2006/main" xmlns:r="http://schemas.openxmlformats.org/officeDocument/2006/relationships" xmlns:p="http://schemas.openxmlformats.org/presentationml/2006/main">
+  <p:cSld>
+    <p:spTree>
+      <p:nvGrpSpPr>
+        <p:cNvPr id="1" name=""/>
+        <p:cNvGrpSpPr/>
+        <p:nvPr/>
+      </p:nvGrpSpPr>
+      <p:grpSpPr>
+        <a:xfrm>
+          <a:off x="0" y="0"/>
+          <a:ext cx="0" cy="0"/>
+          <a:chOff x="0" y="0"/>
+          <a:chExt cx="0" cy="0"/>
+        </a:xfrm>
+      </p:grpSpPr>
+      <p:sp>
+        <p:nvSpPr>
+          <p:cNvPr id="4" name="TextBox 3">
+            <a:extLst>
+              <a:ext uri="{FF2B5EF4-FFF2-40B4-BE49-F238E27FC236}">
+                <a16:creationId xmlns:a16="http://schemas.microsoft.com/office/drawing/2014/main" id="{3EC59CFD-01CA-4D80-A24D-36B27A00B98B}"/>
+              </a:ext>
+            </a:extLst>
+          </p:cNvPr>
+          <p:cNvSpPr txBox="1"/>
+          <p:nvPr/>
+        </p:nvSpPr>
+        <p:spPr>
+          <a:xfrm>
+            <a:off x="5500324" y="2567031"/>
+            <a:ext cx="1191352" cy="553998"/>
+          </a:xfrm>
+          <a:prstGeom prst="rect">
+            <a:avLst/>
+          </a:prstGeom>
+          <a:noFill/>
+        </p:spPr>
+        <p:txBody>
+          <a:bodyPr wrap="none" rtlCol="0">
+            <a:spAutoFit/>
+          </a:bodyPr>
+          <a:lstStyle/>
+          <a:p>
+            <a:pPr algn="ctr"/>
+            <a:r>
+              <a:rPr lang="en-US" sz="3000" b="1" i="1" dirty="0">
+                <a:solidFill>
+                  <a:schemeClr val="bg1"/>
+                </a:solidFill>
+              </a:rPr>
+              <a:t>Demo</a:t>
+            </a:r>
+          </a:p>
+        </p:txBody>
+      </p:sp>
+      <p:sp>
+        <p:nvSpPr>
+          <p:cNvPr id="5" name="TextBox 4">
+            <a:extLst>
+              <a:ext uri="{FF2B5EF4-FFF2-40B4-BE49-F238E27FC236}">
+                <a16:creationId xmlns:a16="http://schemas.microsoft.com/office/drawing/2014/main" id="{5F413FE6-5186-4752-8038-F0DEA0B82676}"/>
+              </a:ext>
+            </a:extLst>
+          </p:cNvPr>
+          <p:cNvSpPr txBox="1"/>
+          <p:nvPr/>
+        </p:nvSpPr>
+        <p:spPr>
+          <a:xfrm>
+            <a:off x="3334667" y="3216422"/>
+            <a:ext cx="5522667" cy="1015663"/>
+          </a:xfrm>
+          <a:prstGeom prst="rect">
+            <a:avLst/>
+          </a:prstGeom>
+          <a:noFill/>
+        </p:spPr>
+        <p:txBody>
+          <a:bodyPr wrap="none" rtlCol="0">
+            <a:spAutoFit/>
+          </a:bodyPr>
+          <a:lstStyle/>
+          <a:p>
+            <a:pPr algn="ctr"/>
+            <a:r>
+              <a:rPr lang="en-US" sz="6000" dirty="0">
+                <a:solidFill>
+                  <a:schemeClr val="bg1"/>
+                </a:solidFill>
+              </a:rPr>
+              <a:t>space.itforge.io</a:t>
+            </a:r>
+          </a:p>
+        </p:txBody>
+      </p:sp>
+    </p:spTree>
+    <p:extLst>
+      <p:ext uri="{BB962C8B-B14F-4D97-AF65-F5344CB8AC3E}">
+        <p14:creationId xmlns:p14="http://schemas.microsoft.com/office/powerpoint/2010/main" val="3846915307"/>
+      </p:ext>
+    </p:extLst>
+  </p:cSld>
+  <p:clrMapOvr>
+    <a:masterClrMapping/>
+  </p:clrMapOvr>
+</p:sld>
+</file>
+
 <file path=ppt/slides/slide2.xml><?xml version="1.0" encoding="utf-8"?>
 <p:sld xmlns:a="http://schemas.openxmlformats.org/drawingml/2006/main" xmlns:r="http://schemas.openxmlformats.org/officeDocument/2006/relationships" xmlns:p="http://schemas.openxmlformats.org/presentationml/2006/main">
   <p:cSld>
@@ -5226,6 +5376,116 @@
           <a:chExt cx="0" cy="0"/>
         </a:xfrm>
       </p:grpSpPr>
+      <p:sp>
+        <p:nvSpPr>
+          <p:cNvPr id="2" name="TextBox 1">
+            <a:extLst>
+              <a:ext uri="{FF2B5EF4-FFF2-40B4-BE49-F238E27FC236}">
+                <a16:creationId xmlns:a16="http://schemas.microsoft.com/office/drawing/2014/main" id="{53E08343-2CA5-44CE-9F35-3E70CC1E0052}"/>
+              </a:ext>
+            </a:extLst>
+          </p:cNvPr>
+          <p:cNvSpPr txBox="1"/>
+          <p:nvPr/>
+        </p:nvSpPr>
+        <p:spPr>
+          <a:xfrm>
+            <a:off x="3425238" y="2421052"/>
+            <a:ext cx="5341527" cy="1323439"/>
+          </a:xfrm>
+          <a:prstGeom prst="rect">
+            <a:avLst/>
+          </a:prstGeom>
+          <a:noFill/>
+        </p:spPr>
+        <p:txBody>
+          <a:bodyPr wrap="none" rtlCol="0">
+            <a:spAutoFit/>
+          </a:bodyPr>
+          <a:lstStyle/>
+          <a:p>
+            <a:pPr algn="ctr"/>
+            <a:r>
+              <a:rPr lang="en-US" sz="8000" b="1" dirty="0">
+                <a:solidFill>
+                  <a:schemeClr val="bg1"/>
+                </a:solidFill>
+              </a:rPr>
+              <a:t>API-based</a:t>
+            </a:r>
+          </a:p>
+        </p:txBody>
+      </p:sp>
+      <p:sp>
+        <p:nvSpPr>
+          <p:cNvPr id="3" name="TextBox 2">
+            <a:extLst>
+              <a:ext uri="{FF2B5EF4-FFF2-40B4-BE49-F238E27FC236}">
+                <a16:creationId xmlns:a16="http://schemas.microsoft.com/office/drawing/2014/main" id="{BE9820D2-FF3D-4859-9F1B-6B82E875F40E}"/>
+              </a:ext>
+            </a:extLst>
+          </p:cNvPr>
+          <p:cNvSpPr txBox="1"/>
+          <p:nvPr/>
+        </p:nvSpPr>
+        <p:spPr>
+          <a:xfrm>
+            <a:off x="4103308" y="3879542"/>
+            <a:ext cx="3985386" cy="430887"/>
+          </a:xfrm>
+          <a:prstGeom prst="rect">
+            <a:avLst/>
+          </a:prstGeom>
+          <a:noFill/>
+        </p:spPr>
+        <p:txBody>
+          <a:bodyPr wrap="none" rtlCol="0">
+            <a:spAutoFit/>
+          </a:bodyPr>
+          <a:lstStyle/>
+          <a:p>
+            <a:pPr algn="ctr"/>
+            <a:r>
+              <a:rPr lang="en-US" sz="2200" dirty="0">
+                <a:solidFill>
+                  <a:schemeClr val="bg1"/>
+                </a:solidFill>
+              </a:rPr>
+              <a:t>ready for third-party accesses</a:t>
+            </a:r>
+          </a:p>
+        </p:txBody>
+      </p:sp>
+    </p:spTree>
+    <p:extLst>
+      <p:ext uri="{BB962C8B-B14F-4D97-AF65-F5344CB8AC3E}">
+        <p14:creationId xmlns:p14="http://schemas.microsoft.com/office/powerpoint/2010/main" val="3868707770"/>
+      </p:ext>
+    </p:extLst>
+  </p:cSld>
+  <p:clrMapOvr>
+    <a:masterClrMapping/>
+  </p:clrMapOvr>
+</p:sld>
+</file>
+
+<file path=ppt/slides/slide7.xml><?xml version="1.0" encoding="utf-8"?>
+<p:sld xmlns:a="http://schemas.openxmlformats.org/drawingml/2006/main" xmlns:r="http://schemas.openxmlformats.org/officeDocument/2006/relationships" xmlns:p="http://schemas.openxmlformats.org/presentationml/2006/main">
+  <p:cSld>
+    <p:spTree>
+      <p:nvGrpSpPr>
+        <p:cNvPr id="1" name=""/>
+        <p:cNvGrpSpPr/>
+        <p:nvPr/>
+      </p:nvGrpSpPr>
+      <p:grpSpPr>
+        <a:xfrm>
+          <a:off x="0" y="0"/>
+          <a:ext cx="0" cy="0"/>
+          <a:chOff x="0" y="0"/>
+          <a:chExt cx="0" cy="0"/>
+        </a:xfrm>
+      </p:grpSpPr>
       <p:pic>
         <p:nvPicPr>
           <p:cNvPr id="5" name="Picture 4">
@@ -5254,7 +5514,7 @@
         </p:blipFill>
         <p:spPr>
           <a:xfrm>
-            <a:off x="3181815" y="1380440"/>
+            <a:off x="5477087" y="1620135"/>
             <a:ext cx="1332086" cy="1491937"/>
           </a:xfrm>
           <a:prstGeom prst="rect">
@@ -5290,8 +5550,8 @@
         </p:blipFill>
         <p:spPr>
           <a:xfrm>
-            <a:off x="4413224" y="4243080"/>
-            <a:ext cx="2133971" cy="1305431"/>
+            <a:off x="1338211" y="4909859"/>
+            <a:ext cx="2004201" cy="1226046"/>
           </a:xfrm>
           <a:prstGeom prst="rect">
             <a:avLst/>
@@ -5326,7 +5586,7 @@
         </p:blipFill>
         <p:spPr>
           <a:xfrm>
-            <a:off x="1338211" y="1380441"/>
+            <a:off x="3633483" y="1620136"/>
             <a:ext cx="916102" cy="1490192"/>
           </a:xfrm>
           <a:prstGeom prst="rect">
@@ -5334,58 +5594,22 @@
           </a:prstGeom>
         </p:spPr>
       </p:pic>
-      <p:pic>
-        <p:nvPicPr>
-          <p:cNvPr id="3" name="Picture 2">
-            <a:extLst>
-              <a:ext uri="{FF2B5EF4-FFF2-40B4-BE49-F238E27FC236}">
-                <a16:creationId xmlns:a16="http://schemas.microsoft.com/office/drawing/2014/main" id="{50B438B8-D19F-472C-B81B-7414AC887880}"/>
-              </a:ext>
-            </a:extLst>
-          </p:cNvPr>
-          <p:cNvPicPr>
-            <a:picLocks noChangeAspect="1"/>
-          </p:cNvPicPr>
+      <p:sp>
+        <p:nvSpPr>
+          <p:cNvPr id="4" name="TextBox 3">
+            <a:extLst>
+              <a:ext uri="{FF2B5EF4-FFF2-40B4-BE49-F238E27FC236}">
+                <a16:creationId xmlns:a16="http://schemas.microsoft.com/office/drawing/2014/main" id="{99C6596B-12E2-42F4-9B93-38670C997B7D}"/>
+              </a:ext>
+            </a:extLst>
+          </p:cNvPr>
+          <p:cNvSpPr txBox="1"/>
           <p:nvPr/>
-        </p:nvPicPr>
-        <p:blipFill>
-          <a:blip r:embed="rId5">
-            <a:extLst>
-              <a:ext uri="{28A0092B-C50C-407E-A947-70E740481C1C}">
-                <a14:useLocalDpi xmlns:a14="http://schemas.microsoft.com/office/drawing/2010/main" val="0"/>
-              </a:ext>
-            </a:extLst>
-          </a:blip>
-          <a:stretch>
-            <a:fillRect/>
-          </a:stretch>
-        </p:blipFill>
+        </p:nvSpPr>
         <p:spPr>
           <a:xfrm>
-            <a:off x="5441403" y="1374798"/>
-            <a:ext cx="1105792" cy="1495835"/>
-          </a:xfrm>
-          <a:prstGeom prst="rect">
-            <a:avLst/>
-          </a:prstGeom>
-        </p:spPr>
-      </p:pic>
-      <p:sp>
-        <p:nvSpPr>
-          <p:cNvPr id="4" name="TextBox 3">
-            <a:extLst>
-              <a:ext uri="{FF2B5EF4-FFF2-40B4-BE49-F238E27FC236}">
-                <a16:creationId xmlns:a16="http://schemas.microsoft.com/office/drawing/2014/main" id="{99C6596B-12E2-42F4-9B93-38670C997B7D}"/>
-              </a:ext>
-            </a:extLst>
-          </p:cNvPr>
-          <p:cNvSpPr txBox="1"/>
-          <p:nvPr/>
-        </p:nvSpPr>
-        <p:spPr>
-          <a:xfrm>
-            <a:off x="8194089" y="1737994"/>
-            <a:ext cx="2994731" cy="769441"/>
+            <a:off x="1240555" y="690427"/>
+            <a:ext cx="2101857" cy="553998"/>
           </a:xfrm>
           <a:prstGeom prst="rect">
             <a:avLst/>
@@ -5399,7 +5623,7 @@
           <a:lstStyle/>
           <a:p>
             <a:r>
-              <a:rPr lang="en-US" sz="4400" b="1" dirty="0">
+              <a:rPr lang="en-US" sz="3000" b="1" dirty="0">
                 <a:solidFill>
                   <a:schemeClr val="bg1"/>
                 </a:solidFill>
@@ -5423,8 +5647,8 @@
         </p:nvSpPr>
         <p:spPr>
           <a:xfrm>
-            <a:off x="8194089" y="4511074"/>
-            <a:ext cx="3203121" cy="769441"/>
+            <a:off x="1240555" y="3952735"/>
+            <a:ext cx="2246128" cy="553998"/>
           </a:xfrm>
           <a:prstGeom prst="rect">
             <a:avLst/>
@@ -5438,7 +5662,7 @@
           <a:lstStyle/>
           <a:p>
             <a:r>
-              <a:rPr lang="en-US" sz="4400" b="1" dirty="0">
+              <a:rPr lang="en-US" sz="3000" b="1" dirty="0">
                 <a:solidFill>
                   <a:schemeClr val="bg1"/>
                 </a:solidFill>
@@ -5448,6 +5672,92 @@
           </a:p>
         </p:txBody>
       </p:sp>
+      <p:cxnSp>
+        <p:nvCxnSpPr>
+          <p:cNvPr id="10" name="Straight Connector 9">
+            <a:extLst>
+              <a:ext uri="{FF2B5EF4-FFF2-40B4-BE49-F238E27FC236}">
+                <a16:creationId xmlns:a16="http://schemas.microsoft.com/office/drawing/2014/main" id="{5D821B20-B961-4FCA-8F59-5C1A034B03A0}"/>
+              </a:ext>
+            </a:extLst>
+          </p:cNvPr>
+          <p:cNvCxnSpPr>
+            <a:cxnSpLocks/>
+          </p:cNvCxnSpPr>
+          <p:nvPr/>
+        </p:nvCxnSpPr>
+        <p:spPr>
+          <a:xfrm>
+            <a:off x="1338211" y="4506733"/>
+            <a:ext cx="5470962" cy="0"/>
+          </a:xfrm>
+          <a:prstGeom prst="line">
+            <a:avLst/>
+          </a:prstGeom>
+          <a:ln w="12700">
+            <a:solidFill>
+              <a:schemeClr val="bg1"/>
+            </a:solidFill>
+          </a:ln>
+        </p:spPr>
+        <p:style>
+          <a:lnRef idx="1">
+            <a:schemeClr val="accent1"/>
+          </a:lnRef>
+          <a:fillRef idx="0">
+            <a:schemeClr val="accent1"/>
+          </a:fillRef>
+          <a:effectRef idx="0">
+            <a:schemeClr val="accent1"/>
+          </a:effectRef>
+          <a:fontRef idx="minor">
+            <a:schemeClr val="tx1"/>
+          </a:fontRef>
+        </p:style>
+      </p:cxnSp>
+      <p:cxnSp>
+        <p:nvCxnSpPr>
+          <p:cNvPr id="13" name="Straight Connector 12">
+            <a:extLst>
+              <a:ext uri="{FF2B5EF4-FFF2-40B4-BE49-F238E27FC236}">
+                <a16:creationId xmlns:a16="http://schemas.microsoft.com/office/drawing/2014/main" id="{74B27D97-A0FA-48F8-92C6-8F5F317888D4}"/>
+              </a:ext>
+            </a:extLst>
+          </p:cNvPr>
+          <p:cNvCxnSpPr>
+            <a:cxnSpLocks/>
+          </p:cNvCxnSpPr>
+          <p:nvPr/>
+        </p:nvCxnSpPr>
+        <p:spPr>
+          <a:xfrm>
+            <a:off x="1338211" y="1244425"/>
+            <a:ext cx="5470962" cy="0"/>
+          </a:xfrm>
+          <a:prstGeom prst="line">
+            <a:avLst/>
+          </a:prstGeom>
+          <a:ln w="12700">
+            <a:solidFill>
+              <a:schemeClr val="bg1"/>
+            </a:solidFill>
+          </a:ln>
+        </p:spPr>
+        <p:style>
+          <a:lnRef idx="1">
+            <a:schemeClr val="accent1"/>
+          </a:lnRef>
+          <a:fillRef idx="0">
+            <a:schemeClr val="accent1"/>
+          </a:fillRef>
+          <a:effectRef idx="0">
+            <a:schemeClr val="accent1"/>
+          </a:effectRef>
+          <a:fontRef idx="minor">
+            <a:schemeClr val="tx1"/>
+          </a:fontRef>
+        </p:style>
+      </p:cxnSp>
     </p:spTree>
     <p:extLst>
       <p:ext uri="{BB962C8B-B14F-4D97-AF65-F5344CB8AC3E}">
@@ -5461,7 +5771,7 @@
 </p:sld>
 </file>
 
-<file path=ppt/slides/slide7.xml><?xml version="1.0" encoding="utf-8"?>
+<file path=ppt/slides/slide8.xml><?xml version="1.0" encoding="utf-8"?>
 <p:sld xmlns:a="http://schemas.openxmlformats.org/drawingml/2006/main" xmlns:r="http://schemas.openxmlformats.org/officeDocument/2006/relationships" xmlns:p="http://schemas.openxmlformats.org/presentationml/2006/main">
   <p:cSld>
     <p:spTree>
@@ -5957,7 +6267,7 @@
 </p:sld>
 </file>
 
-<file path=ppt/slides/slide8.xml><?xml version="1.0" encoding="utf-8"?>
+<file path=ppt/slides/slide9.xml><?xml version="1.0" encoding="utf-8"?>
 <p:sld xmlns:a="http://schemas.openxmlformats.org/drawingml/2006/main" xmlns:r="http://schemas.openxmlformats.org/officeDocument/2006/relationships" xmlns:p="http://schemas.openxmlformats.org/presentationml/2006/main">
   <p:cSld>
     <p:spTree>
@@ -6050,116 +6360,6 @@
     <p:extLst>
       <p:ext uri="{BB962C8B-B14F-4D97-AF65-F5344CB8AC3E}">
         <p14:creationId xmlns:p14="http://schemas.microsoft.com/office/powerpoint/2010/main" val="2787713107"/>
-      </p:ext>
-    </p:extLst>
-  </p:cSld>
-  <p:clrMapOvr>
-    <a:masterClrMapping/>
-  </p:clrMapOvr>
-</p:sld>
-</file>
-
-<file path=ppt/slides/slide9.xml><?xml version="1.0" encoding="utf-8"?>
-<p:sld xmlns:a="http://schemas.openxmlformats.org/drawingml/2006/main" xmlns:r="http://schemas.openxmlformats.org/officeDocument/2006/relationships" xmlns:p="http://schemas.openxmlformats.org/presentationml/2006/main">
-  <p:cSld>
-    <p:spTree>
-      <p:nvGrpSpPr>
-        <p:cNvPr id="1" name=""/>
-        <p:cNvGrpSpPr/>
-        <p:nvPr/>
-      </p:nvGrpSpPr>
-      <p:grpSpPr>
-        <a:xfrm>
-          <a:off x="0" y="0"/>
-          <a:ext cx="0" cy="0"/>
-          <a:chOff x="0" y="0"/>
-          <a:chExt cx="0" cy="0"/>
-        </a:xfrm>
-      </p:grpSpPr>
-      <p:sp>
-        <p:nvSpPr>
-          <p:cNvPr id="4" name="TextBox 3">
-            <a:extLst>
-              <a:ext uri="{FF2B5EF4-FFF2-40B4-BE49-F238E27FC236}">
-                <a16:creationId xmlns:a16="http://schemas.microsoft.com/office/drawing/2014/main" id="{3EC59CFD-01CA-4D80-A24D-36B27A00B98B}"/>
-              </a:ext>
-            </a:extLst>
-          </p:cNvPr>
-          <p:cNvSpPr txBox="1"/>
-          <p:nvPr/>
-        </p:nvSpPr>
-        <p:spPr>
-          <a:xfrm>
-            <a:off x="5500324" y="2567031"/>
-            <a:ext cx="1191352" cy="553998"/>
-          </a:xfrm>
-          <a:prstGeom prst="rect">
-            <a:avLst/>
-          </a:prstGeom>
-          <a:noFill/>
-        </p:spPr>
-        <p:txBody>
-          <a:bodyPr wrap="none" rtlCol="0">
-            <a:spAutoFit/>
-          </a:bodyPr>
-          <a:lstStyle/>
-          <a:p>
-            <a:pPr algn="ctr"/>
-            <a:r>
-              <a:rPr lang="en-US" sz="3000" b="1" i="1" dirty="0">
-                <a:solidFill>
-                  <a:schemeClr val="bg1"/>
-                </a:solidFill>
-              </a:rPr>
-              <a:t>Demo</a:t>
-            </a:r>
-          </a:p>
-        </p:txBody>
-      </p:sp>
-      <p:sp>
-        <p:nvSpPr>
-          <p:cNvPr id="5" name="TextBox 4">
-            <a:extLst>
-              <a:ext uri="{FF2B5EF4-FFF2-40B4-BE49-F238E27FC236}">
-                <a16:creationId xmlns:a16="http://schemas.microsoft.com/office/drawing/2014/main" id="{5F413FE6-5186-4752-8038-F0DEA0B82676}"/>
-              </a:ext>
-            </a:extLst>
-          </p:cNvPr>
-          <p:cNvSpPr txBox="1"/>
-          <p:nvPr/>
-        </p:nvSpPr>
-        <p:spPr>
-          <a:xfrm>
-            <a:off x="3334667" y="3216422"/>
-            <a:ext cx="5522667" cy="1015663"/>
-          </a:xfrm>
-          <a:prstGeom prst="rect">
-            <a:avLst/>
-          </a:prstGeom>
-          <a:noFill/>
-        </p:spPr>
-        <p:txBody>
-          <a:bodyPr wrap="none" rtlCol="0">
-            <a:spAutoFit/>
-          </a:bodyPr>
-          <a:lstStyle/>
-          <a:p>
-            <a:pPr algn="ctr"/>
-            <a:r>
-              <a:rPr lang="en-US" sz="6000" dirty="0">
-                <a:solidFill>
-                  <a:schemeClr val="bg1"/>
-                </a:solidFill>
-              </a:rPr>
-              <a:t>space.itforge.io</a:t>
-            </a:r>
-          </a:p>
-        </p:txBody>
-      </p:sp>
-    </p:spTree>
-    <p:extLst>
-      <p:ext uri="{BB962C8B-B14F-4D97-AF65-F5344CB8AC3E}">
-        <p14:creationId xmlns:p14="http://schemas.microsoft.com/office/powerpoint/2010/main" val="3846915307"/>
       </p:ext>
     </p:extLst>
   </p:cSld>

</xml_diff>